<commit_message>
Super spreading model MCMC multi parameter
Super spreading model MCMC multi parameter
</commit_message>
<xml_diff>
--- a/Mathematical_Models/adaptive_scaling_mcmc_week_aug_16th.pptx
+++ b/Mathematical_Models/adaptive_scaling_mcmc_week_aug_16th.pptx
@@ -211,7 +211,7 @@
           <a:p>
             <a:fld id="{8F7E32F0-930A-44E6-8941-235E88E9C716}" type="datetimeFigureOut">
               <a:rPr lang="en-IE" smtClean="0"/>
-              <a:t>03/08/2021</a:t>
+              <a:t>26/08/2021</a:t>
             </a:fld>
             <a:endParaRPr lang="en-IE"/>
           </a:p>
@@ -669,6 +669,224 @@
 </p:notes>
 </file>
 
+<file path=ppt/notesSlides/notesSlide3.xml><?xml version="1.0" encoding="utf-8"?>
+<p:notes xmlns:a="http://schemas.openxmlformats.org/drawingml/2006/main" xmlns:r="http://schemas.openxmlformats.org/officeDocument/2006/relationships" xmlns:p="http://schemas.openxmlformats.org/presentationml/2006/main">
+  <p:cSld>
+    <p:spTree>
+      <p:nvGrpSpPr>
+        <p:cNvPr id="1" name=""/>
+        <p:cNvGrpSpPr/>
+        <p:nvPr/>
+      </p:nvGrpSpPr>
+      <p:grpSpPr>
+        <a:xfrm>
+          <a:off x="0" y="0"/>
+          <a:ext cx="0" cy="0"/>
+          <a:chOff x="0" y="0"/>
+          <a:chExt cx="0" cy="0"/>
+        </a:xfrm>
+      </p:grpSpPr>
+      <p:sp>
+        <p:nvSpPr>
+          <p:cNvPr id="2" name="Slide Image Placeholder 1"/>
+          <p:cNvSpPr>
+            <a:spLocks noGrp="1" noRot="1" noChangeAspect="1"/>
+          </p:cNvSpPr>
+          <p:nvPr>
+            <p:ph type="sldImg"/>
+          </p:nvPr>
+        </p:nvSpPr>
+        <p:spPr/>
+      </p:sp>
+      <p:sp>
+        <p:nvSpPr>
+          <p:cNvPr id="3" name="Notes Placeholder 2"/>
+          <p:cNvSpPr>
+            <a:spLocks noGrp="1"/>
+          </p:cNvSpPr>
+          <p:nvPr>
+            <p:ph type="body" idx="1"/>
+          </p:nvPr>
+        </p:nvSpPr>
+        <p:spPr/>
+        <p:txBody>
+          <a:bodyPr/>
+          <a:lstStyle/>
+          <a:p>
+            <a:r>
+              <a:rPr lang="en-GB" sz="1200" b="0" i="0" kern="1200" dirty="0" err="1" smtClean="0">
+                <a:solidFill>
+                  <a:schemeClr val="tx1"/>
+                </a:solidFill>
+                <a:effectLst/>
+                <a:latin typeface="+mn-lt"/>
+                <a:ea typeface="+mn-ea"/>
+                <a:cs typeface="+mn-cs"/>
+              </a:rPr>
+              <a:t>Hahah</a:t>
+            </a:r>
+            <a:r>
+              <a:rPr lang="en-GB" sz="1200" b="0" i="0" kern="1200" dirty="0" smtClean="0">
+                <a:solidFill>
+                  <a:schemeClr val="tx1"/>
+                </a:solidFill>
+                <a:effectLst/>
+                <a:latin typeface="+mn-lt"/>
+                <a:ea typeface="+mn-ea"/>
+                <a:cs typeface="+mn-cs"/>
+              </a:rPr>
+              <a:t> still in Dublin, don't fly out to Toulouse till Sunday! Oh nice 70€ return 🙈 I</a:t>
+            </a:r>
+            <a:r>
+              <a:rPr lang="en-GB" sz="1200" b="0" i="0" kern="1200" baseline="0" dirty="0" smtClean="0">
+                <a:solidFill>
+                  <a:schemeClr val="tx1"/>
+                </a:solidFill>
+                <a:effectLst/>
+                <a:latin typeface="+mn-lt"/>
+                <a:ea typeface="+mn-ea"/>
+                <a:cs typeface="+mn-cs"/>
+              </a:rPr>
+              <a:t> never seem to get the cheap ones</a:t>
+            </a:r>
+          </a:p>
+          <a:p>
+            <a:endParaRPr lang="en-GB" sz="1200" b="0" i="0" kern="1200" baseline="0" dirty="0" smtClean="0">
+              <a:solidFill>
+                <a:schemeClr val="tx1"/>
+              </a:solidFill>
+              <a:effectLst/>
+              <a:latin typeface="+mn-lt"/>
+              <a:ea typeface="+mn-ea"/>
+              <a:cs typeface="+mn-cs"/>
+            </a:endParaRPr>
+          </a:p>
+          <a:p>
+            <a:r>
+              <a:rPr lang="en-GB" sz="1200" b="0" i="0" kern="1200" baseline="0" dirty="0" smtClean="0">
+                <a:solidFill>
+                  <a:schemeClr val="tx1"/>
+                </a:solidFill>
+                <a:effectLst/>
+                <a:latin typeface="+mn-lt"/>
+                <a:ea typeface="+mn-ea"/>
+                <a:cs typeface="+mn-cs"/>
+              </a:rPr>
+              <a:t>Ah sorry yeah didn’t mention, ha I don’t know him well but went with a few friends to that big style spot down in Mayo the other week and he said about his big Portugal trip. Ha I remember </a:t>
+            </a:r>
+            <a:r>
+              <a:rPr lang="en-GB" sz="1200" b="0" i="0" kern="1200" baseline="0" dirty="0" err="1" smtClean="0">
+                <a:solidFill>
+                  <a:schemeClr val="tx1"/>
+                </a:solidFill>
+                <a:effectLst/>
+                <a:latin typeface="+mn-lt"/>
+                <a:ea typeface="+mn-ea"/>
+                <a:cs typeface="+mn-cs"/>
+              </a:rPr>
+              <a:t>yous</a:t>
+            </a:r>
+            <a:r>
+              <a:rPr lang="en-GB" sz="1200" b="0" i="0" kern="1200" baseline="0" dirty="0" smtClean="0">
+                <a:solidFill>
+                  <a:schemeClr val="tx1"/>
+                </a:solidFill>
+                <a:effectLst/>
+                <a:latin typeface="+mn-lt"/>
+                <a:ea typeface="+mn-ea"/>
+                <a:cs typeface="+mn-cs"/>
+              </a:rPr>
+              <a:t> all saying about his music at Ciara’s, great job he’s doing down there! I hadn’t heard much about surfing at the spot at </a:t>
+            </a:r>
+            <a:r>
+              <a:rPr lang="en-GB" sz="1200" b="0" i="0" kern="1200" baseline="0" dirty="0" err="1" smtClean="0">
+                <a:solidFill>
+                  <a:schemeClr val="tx1"/>
+                </a:solidFill>
+                <a:effectLst/>
+                <a:latin typeface="+mn-lt"/>
+                <a:ea typeface="+mn-ea"/>
+                <a:cs typeface="+mn-cs"/>
+              </a:rPr>
+              <a:t>Cascais</a:t>
+            </a:r>
+            <a:r>
+              <a:rPr lang="en-GB" sz="1200" b="0" i="0" kern="1200" baseline="0" dirty="0" smtClean="0">
+                <a:solidFill>
+                  <a:schemeClr val="tx1"/>
+                </a:solidFill>
+                <a:effectLst/>
+                <a:latin typeface="+mn-lt"/>
+                <a:ea typeface="+mn-ea"/>
+                <a:cs typeface="+mn-cs"/>
+              </a:rPr>
+              <a:t>, so wanted to run it by someone. </a:t>
+            </a:r>
+          </a:p>
+          <a:p>
+            <a:endParaRPr lang="en-GB" sz="1200" b="0" i="0" kern="1200" baseline="0" dirty="0" smtClean="0">
+              <a:solidFill>
+                <a:schemeClr val="tx1"/>
+              </a:solidFill>
+              <a:effectLst/>
+              <a:latin typeface="+mn-lt"/>
+              <a:ea typeface="+mn-ea"/>
+              <a:cs typeface="+mn-cs"/>
+            </a:endParaRPr>
+          </a:p>
+          <a:p>
+            <a:r>
+              <a:rPr lang="en-GB" sz="1200" b="0" i="0" kern="1200" baseline="0" dirty="0" smtClean="0">
+                <a:solidFill>
+                  <a:schemeClr val="tx1"/>
+                </a:solidFill>
+                <a:effectLst/>
+                <a:latin typeface="+mn-lt"/>
+                <a:ea typeface="+mn-ea"/>
+                <a:cs typeface="+mn-cs"/>
+              </a:rPr>
+              <a:t>Nice yeah same, the Irish games are great, the buzz around the 6 nations! Would you support Leinster aswell?</a:t>
+            </a:r>
+            <a:endParaRPr lang="en-IE" dirty="0"/>
+          </a:p>
+        </p:txBody>
+      </p:sp>
+      <p:sp>
+        <p:nvSpPr>
+          <p:cNvPr id="4" name="Slide Number Placeholder 3"/>
+          <p:cNvSpPr>
+            <a:spLocks noGrp="1"/>
+          </p:cNvSpPr>
+          <p:nvPr>
+            <p:ph type="sldNum" sz="quarter" idx="10"/>
+          </p:nvPr>
+        </p:nvSpPr>
+        <p:spPr/>
+        <p:txBody>
+          <a:bodyPr/>
+          <a:lstStyle/>
+          <a:p>
+            <a:fld id="{F559CD70-93A7-41A1-9B03-754D54A8F9E8}" type="slidenum">
+              <a:rPr lang="en-IE" smtClean="0"/>
+              <a:t>14</a:t>
+            </a:fld>
+            <a:endParaRPr lang="en-IE"/>
+          </a:p>
+        </p:txBody>
+      </p:sp>
+    </p:spTree>
+    <p:extLst>
+      <p:ext uri="{BB962C8B-B14F-4D97-AF65-F5344CB8AC3E}">
+        <p14:creationId xmlns:p14="http://schemas.microsoft.com/office/powerpoint/2010/main" val="3681068516"/>
+      </p:ext>
+    </p:extLst>
+  </p:cSld>
+  <p:clrMapOvr>
+    <a:masterClrMapping/>
+  </p:clrMapOvr>
+</p:notes>
+</file>
+
 <file path=ppt/slideLayouts/slideLayout1.xml><?xml version="1.0" encoding="utf-8"?>
 <p:sldLayout xmlns:a="http://schemas.openxmlformats.org/drawingml/2006/main" xmlns:r="http://schemas.openxmlformats.org/officeDocument/2006/relationships" xmlns:p="http://schemas.openxmlformats.org/presentationml/2006/main" type="title" preserve="1">
   <p:cSld name="Title Slide">
@@ -800,7 +1018,7 @@
           <a:p>
             <a:fld id="{C697B097-996D-432D-9C37-1E937D04D218}" type="datetimeFigureOut">
               <a:rPr lang="en-IE" smtClean="0"/>
-              <a:t>03/08/2021</a:t>
+              <a:t>26/08/2021</a:t>
             </a:fld>
             <a:endParaRPr lang="en-IE"/>
           </a:p>
@@ -970,7 +1188,7 @@
           <a:p>
             <a:fld id="{C697B097-996D-432D-9C37-1E937D04D218}" type="datetimeFigureOut">
               <a:rPr lang="en-IE" smtClean="0"/>
-              <a:t>03/08/2021</a:t>
+              <a:t>26/08/2021</a:t>
             </a:fld>
             <a:endParaRPr lang="en-IE"/>
           </a:p>
@@ -1150,7 +1368,7 @@
           <a:p>
             <a:fld id="{C697B097-996D-432D-9C37-1E937D04D218}" type="datetimeFigureOut">
               <a:rPr lang="en-IE" smtClean="0"/>
-              <a:t>03/08/2021</a:t>
+              <a:t>26/08/2021</a:t>
             </a:fld>
             <a:endParaRPr lang="en-IE"/>
           </a:p>
@@ -1340,7 +1558,7 @@
           <a:p>
             <a:fld id="{C697B097-996D-432D-9C37-1E937D04D218}" type="datetimeFigureOut">
               <a:rPr lang="en-IE" smtClean="0"/>
-              <a:t>03/08/2021</a:t>
+              <a:t>26/08/2021</a:t>
             </a:fld>
             <a:endParaRPr lang="en-IE"/>
           </a:p>
@@ -1586,7 +1804,7 @@
           <a:p>
             <a:fld id="{C697B097-996D-432D-9C37-1E937D04D218}" type="datetimeFigureOut">
               <a:rPr lang="en-IE" smtClean="0"/>
-              <a:t>03/08/2021</a:t>
+              <a:t>26/08/2021</a:t>
             </a:fld>
             <a:endParaRPr lang="en-IE"/>
           </a:p>
@@ -1818,7 +2036,7 @@
           <a:p>
             <a:fld id="{C697B097-996D-432D-9C37-1E937D04D218}" type="datetimeFigureOut">
               <a:rPr lang="en-IE" smtClean="0"/>
-              <a:t>03/08/2021</a:t>
+              <a:t>26/08/2021</a:t>
             </a:fld>
             <a:endParaRPr lang="en-IE"/>
           </a:p>
@@ -2185,7 +2403,7 @@
           <a:p>
             <a:fld id="{C697B097-996D-432D-9C37-1E937D04D218}" type="datetimeFigureOut">
               <a:rPr lang="en-IE" smtClean="0"/>
-              <a:t>03/08/2021</a:t>
+              <a:t>26/08/2021</a:t>
             </a:fld>
             <a:endParaRPr lang="en-IE"/>
           </a:p>
@@ -2303,7 +2521,7 @@
           <a:p>
             <a:fld id="{C697B097-996D-432D-9C37-1E937D04D218}" type="datetimeFigureOut">
               <a:rPr lang="en-IE" smtClean="0"/>
-              <a:t>03/08/2021</a:t>
+              <a:t>26/08/2021</a:t>
             </a:fld>
             <a:endParaRPr lang="en-IE"/>
           </a:p>
@@ -2398,7 +2616,7 @@
           <a:p>
             <a:fld id="{C697B097-996D-432D-9C37-1E937D04D218}" type="datetimeFigureOut">
               <a:rPr lang="en-IE" smtClean="0"/>
-              <a:t>03/08/2021</a:t>
+              <a:t>26/08/2021</a:t>
             </a:fld>
             <a:endParaRPr lang="en-IE"/>
           </a:p>
@@ -2675,7 +2893,7 @@
           <a:p>
             <a:fld id="{C697B097-996D-432D-9C37-1E937D04D218}" type="datetimeFigureOut">
               <a:rPr lang="en-IE" smtClean="0"/>
-              <a:t>03/08/2021</a:t>
+              <a:t>26/08/2021</a:t>
             </a:fld>
             <a:endParaRPr lang="en-IE"/>
           </a:p>
@@ -2928,7 +3146,7 @@
           <a:p>
             <a:fld id="{C697B097-996D-432D-9C37-1E937D04D218}" type="datetimeFigureOut">
               <a:rPr lang="en-IE" smtClean="0"/>
-              <a:t>03/08/2021</a:t>
+              <a:t>26/08/2021</a:t>
             </a:fld>
             <a:endParaRPr lang="en-IE"/>
           </a:p>
@@ -3141,7 +3359,7 @@
           <a:p>
             <a:fld id="{C697B097-996D-432D-9C37-1E937D04D218}" type="datetimeFigureOut">
               <a:rPr lang="en-IE" smtClean="0"/>
-              <a:t>03/08/2021</a:t>
+              <a:t>26/08/2021</a:t>
             </a:fld>
             <a:endParaRPr lang="en-IE"/>
           </a:p>
@@ -3714,22 +3932,14 @@
           <a:p>
             <a:r>
               <a:rPr lang="en-IE" sz="3000" dirty="0" smtClean="0"/>
-              <a:t>Results - Adaptive </a:t>
-            </a:r>
-            <a:r>
-              <a:rPr lang="en-IE" sz="3000" dirty="0" smtClean="0"/>
-              <a:t>Scaling Monte </a:t>
-            </a:r>
-            <a:r>
-              <a:rPr lang="en-IE" sz="3000" dirty="0" smtClean="0"/>
-              <a:t>Carlo</a:t>
+              <a:t>Results - Adaptive Scaling Monte Carlo</a:t>
             </a:r>
             <a:endParaRPr lang="en-IE" sz="3000" dirty="0"/>
           </a:p>
         </p:txBody>
       </p:sp>
-      <mc:AlternateContent xmlns:mc="http://schemas.openxmlformats.org/markup-compatibility/2006">
-        <mc:Choice xmlns:a14="http://schemas.microsoft.com/office/drawing/2010/main" Requires="a14">
+      <mc:AlternateContent xmlns:mc="http://schemas.openxmlformats.org/markup-compatibility/2006" xmlns:a14="http://schemas.microsoft.com/office/drawing/2010/main">
+        <mc:Choice Requires="a14">
           <p:sp>
             <p:nvSpPr>
               <p:cNvPr id="11" name="TextBox 10"/>
@@ -3797,15 +4007,7 @@
                       <a:srgbClr val="FFC000"/>
                     </a:solidFill>
                   </a:rPr>
-                  <a:t> of simulated data = </a:t>
-                </a:r>
-                <a:r>
-                  <a:rPr lang="en-IE" sz="2200" b="1" dirty="0" smtClean="0">
-                    <a:solidFill>
-                      <a:srgbClr val="FFC000"/>
-                    </a:solidFill>
-                  </a:rPr>
-                  <a:t>2.75 </a:t>
+                  <a:t> of simulated data = 2.75 </a:t>
                 </a:r>
                 <a:endParaRPr lang="en-IE" sz="2200" b="1" dirty="0">
                   <a:solidFill>
@@ -3816,7 +4018,7 @@
             </p:txBody>
           </p:sp>
         </mc:Choice>
-        <mc:Fallback>
+        <mc:Fallback xmlns="">
           <p:sp>
             <p:nvSpPr>
               <p:cNvPr id="11" name="TextBox 10"/>
@@ -4062,15 +4264,7 @@
           <a:p>
             <a:r>
               <a:rPr lang="en-IE" sz="3000" dirty="0" smtClean="0"/>
-              <a:t>Results </a:t>
-            </a:r>
-            <a:r>
-              <a:rPr lang="en-IE" sz="3000" dirty="0" smtClean="0"/>
-              <a:t>– Original Adaptive </a:t>
-            </a:r>
-            <a:r>
-              <a:rPr lang="en-IE" sz="3000" dirty="0" smtClean="0"/>
-              <a:t>Monte Carlo</a:t>
+              <a:t>Results – Original Adaptive Monte Carlo</a:t>
             </a:r>
             <a:endParaRPr lang="en-IE" sz="3000" dirty="0"/>
           </a:p>
@@ -5139,8 +5333,8 @@
           </a:p>
         </p:txBody>
       </p:sp>
-      <mc:AlternateContent xmlns:mc="http://schemas.openxmlformats.org/markup-compatibility/2006">
-        <mc:Choice xmlns:a14="http://schemas.microsoft.com/office/drawing/2010/main" Requires="a14">
+      <mc:AlternateContent xmlns:mc="http://schemas.openxmlformats.org/markup-compatibility/2006" xmlns:a14="http://schemas.microsoft.com/office/drawing/2010/main">
+        <mc:Choice Requires="a14">
           <p:sp>
             <p:nvSpPr>
               <p:cNvPr id="3" name="Content Placeholder 2"/>
@@ -5207,11 +5401,7 @@
                 </a14:m>
                 <a:r>
                   <a:rPr lang="en-IE" dirty="0" smtClean="0"/>
-                  <a:t>  = Number of infected in the </a:t>
-                </a:r>
-                <a:r>
-                  <a:rPr lang="en-IE" dirty="0" smtClean="0"/>
-                  <a:t>epidemic at time </a:t>
+                  <a:t>  = Number of infected in the epidemic at time </a:t>
                 </a:r>
                 <a:r>
                   <a:rPr lang="en-IE" i="1" dirty="0" smtClean="0"/>
@@ -5979,7 +6169,7 @@
             </p:txBody>
           </p:sp>
         </mc:Choice>
-        <mc:Fallback>
+        <mc:Fallback xmlns="">
           <p:sp>
             <p:nvSpPr>
               <p:cNvPr id="3" name="Content Placeholder 2"/>
@@ -6513,21 +6703,8 @@
                   <a:srgbClr val="FFC000"/>
                 </a:solidFill>
               </a:rPr>
-              <a:t>Closed form </a:t>
-            </a:r>
-            <a:r>
-              <a:rPr lang="en-IE" b="1" dirty="0" smtClean="0">
-                <a:solidFill>
-                  <a:srgbClr val="FFC000"/>
-                </a:solidFill>
-              </a:rPr>
-              <a:t>– WRONG – SEE LATEXT REPORT</a:t>
-            </a:r>
-            <a:endParaRPr lang="en-IE" b="1" dirty="0" smtClean="0">
-              <a:solidFill>
-                <a:srgbClr val="FFC000"/>
-              </a:solidFill>
-            </a:endParaRPr>
+              <a:t>Closed form – WRONG – SEE LATEXT REPORT</a:t>
+            </a:r>
           </a:p>
           <a:p>
             <a:r>

</xml_diff>